<commit_message>
Update project report powerpoint and PDF files.
</commit_message>
<xml_diff>
--- a/reports/City Trees - Seattle.pptx
+++ b/reports/City Trees - Seattle.pptx
@@ -251,7 +251,7 @@
           <a:p>
             <a:fld id="{FF22EC5A-6E5A-0344-8309-523A08EF18B9}" type="datetimeFigureOut">
               <a:rPr lang="en-US" smtClean="0"/>
-              <a:t>5/19/2023</a:t>
+              <a:t>8/13/23</a:t>
             </a:fld>
             <a:endParaRPr lang="en-US" dirty="0"/>
           </a:p>
@@ -657,7 +657,7 @@
           <a:p>
             <a:r>
               <a:rPr lang="en-US" dirty="0"/>
-              <a:t>One of the key parameters was max_depth, by trimming this value (or not) it droves some of the largest swings in training performance as you can see on the graph above. I capped the max at 40 to try to not completely overfit and instead generalize a bit better to new data.</a:t>
+              <a:t>One of the key parameters was max_depth, by trimming this value (or not) it droves some of the largest swings in training performance as you can see on the graph above. I capped the max at 25 to try to not completely overfit and instead generalize a bit better to new data.</a:t>
             </a:r>
           </a:p>
           <a:p>
@@ -753,7 +753,7 @@
           <a:p>
             <a:r>
               <a:rPr lang="en-US" dirty="0"/>
-              <a:t>Our final model, when applied to the test set of 4,000 records had an overall accuracy of 59%. You can see it still struggled a bit with the imbalanced classes, despite our efforts using SMOTE. </a:t>
+              <a:t>Our final model was training on a sample to save processing power – and when applied to the full data had an accuracy of 62% and the above classification report.</a:t>
             </a:r>
           </a:p>
           <a:p>
@@ -2527,7 +2527,7 @@
           <a:p>
             <a:fld id="{BEA71F60-FA9B-3C4C-BEE5-E4D60F229814}" type="datetimeFigureOut">
               <a:rPr lang="en-US" smtClean="0"/>
-              <a:t>5/19/2023</a:t>
+              <a:t>8/13/23</a:t>
             </a:fld>
             <a:endParaRPr lang="en-US" dirty="0"/>
           </a:p>
@@ -2697,7 +2697,7 @@
           <a:p>
             <a:fld id="{BEA71F60-FA9B-3C4C-BEE5-E4D60F229814}" type="datetimeFigureOut">
               <a:rPr lang="en-US" smtClean="0"/>
-              <a:t>5/19/2023</a:t>
+              <a:t>8/13/23</a:t>
             </a:fld>
             <a:endParaRPr lang="en-US" dirty="0"/>
           </a:p>
@@ -2877,7 +2877,7 @@
           <a:p>
             <a:fld id="{BEA71F60-FA9B-3C4C-BEE5-E4D60F229814}" type="datetimeFigureOut">
               <a:rPr lang="en-US" smtClean="0"/>
-              <a:t>5/19/2023</a:t>
+              <a:t>8/13/23</a:t>
             </a:fld>
             <a:endParaRPr lang="en-US" dirty="0"/>
           </a:p>
@@ -3047,7 +3047,7 @@
           <a:p>
             <a:fld id="{BEA71F60-FA9B-3C4C-BEE5-E4D60F229814}" type="datetimeFigureOut">
               <a:rPr lang="en-US" smtClean="0"/>
-              <a:t>5/19/2023</a:t>
+              <a:t>8/13/23</a:t>
             </a:fld>
             <a:endParaRPr lang="en-US" dirty="0"/>
           </a:p>
@@ -3293,7 +3293,7 @@
           <a:p>
             <a:fld id="{BEA71F60-FA9B-3C4C-BEE5-E4D60F229814}" type="datetimeFigureOut">
               <a:rPr lang="en-US" smtClean="0"/>
-              <a:t>5/19/2023</a:t>
+              <a:t>8/13/23</a:t>
             </a:fld>
             <a:endParaRPr lang="en-US" dirty="0"/>
           </a:p>
@@ -3525,7 +3525,7 @@
           <a:p>
             <a:fld id="{BEA71F60-FA9B-3C4C-BEE5-E4D60F229814}" type="datetimeFigureOut">
               <a:rPr lang="en-US" smtClean="0"/>
-              <a:t>5/19/2023</a:t>
+              <a:t>8/13/23</a:t>
             </a:fld>
             <a:endParaRPr lang="en-US" dirty="0"/>
           </a:p>
@@ -3892,7 +3892,7 @@
           <a:p>
             <a:fld id="{BEA71F60-FA9B-3C4C-BEE5-E4D60F229814}" type="datetimeFigureOut">
               <a:rPr lang="en-US" smtClean="0"/>
-              <a:t>5/19/2023</a:t>
+              <a:t>8/13/23</a:t>
             </a:fld>
             <a:endParaRPr lang="en-US" dirty="0"/>
           </a:p>
@@ -4010,7 +4010,7 @@
           <a:p>
             <a:fld id="{BEA71F60-FA9B-3C4C-BEE5-E4D60F229814}" type="datetimeFigureOut">
               <a:rPr lang="en-US" smtClean="0"/>
-              <a:t>5/19/2023</a:t>
+              <a:t>8/13/23</a:t>
             </a:fld>
             <a:endParaRPr lang="en-US" dirty="0"/>
           </a:p>
@@ -4105,7 +4105,7 @@
           <a:p>
             <a:fld id="{BEA71F60-FA9B-3C4C-BEE5-E4D60F229814}" type="datetimeFigureOut">
               <a:rPr lang="en-US" smtClean="0"/>
-              <a:t>5/19/2023</a:t>
+              <a:t>8/13/23</a:t>
             </a:fld>
             <a:endParaRPr lang="en-US" dirty="0"/>
           </a:p>
@@ -4382,7 +4382,7 @@
           <a:p>
             <a:fld id="{BEA71F60-FA9B-3C4C-BEE5-E4D60F229814}" type="datetimeFigureOut">
               <a:rPr lang="en-US" smtClean="0"/>
-              <a:t>5/19/2023</a:t>
+              <a:t>8/13/23</a:t>
             </a:fld>
             <a:endParaRPr lang="en-US" dirty="0"/>
           </a:p>
@@ -4638,7 +4638,7 @@
           <a:p>
             <a:fld id="{BEA71F60-FA9B-3C4C-BEE5-E4D60F229814}" type="datetimeFigureOut">
               <a:rPr lang="en-US" smtClean="0"/>
-              <a:t>5/19/2023</a:t>
+              <a:t>8/13/23</a:t>
             </a:fld>
             <a:endParaRPr lang="en-US" dirty="0"/>
           </a:p>
@@ -4851,7 +4851,7 @@
           <a:p>
             <a:fld id="{BEA71F60-FA9B-3C4C-BEE5-E4D60F229814}" type="datetimeFigureOut">
               <a:rPr lang="en-US" smtClean="0"/>
-              <a:t>5/19/2023</a:t>
+              <a:t>8/13/23</a:t>
             </a:fld>
             <a:endParaRPr lang="en-US" dirty="0"/>
           </a:p>
@@ -5602,10 +5602,10 @@
       </p:sp>
       <p:pic>
         <p:nvPicPr>
-          <p:cNvPr id="7" name="Picture 6" descr="A picture containing text, screenshot, diagram, plot&#10;&#10;Description automatically generated">
+          <p:cNvPr id="3" name="Picture 2">
             <a:extLst>
               <a:ext uri="{FF2B5EF4-FFF2-40B4-BE49-F238E27FC236}">
-                <a16:creationId xmlns:a16="http://schemas.microsoft.com/office/drawing/2014/main" id="{6A304930-1A0B-9AA1-1483-4FA6352921BC}"/>
+                <a16:creationId xmlns:a16="http://schemas.microsoft.com/office/drawing/2014/main" id="{2B77362E-2399-CCEB-9E0D-50112CC2FA16}"/>
               </a:ext>
             </a:extLst>
           </p:cNvPr>
@@ -5622,8 +5622,8 @@
         </p:blipFill>
         <p:spPr>
           <a:xfrm>
-            <a:off x="2981036" y="1486684"/>
-            <a:ext cx="6229927" cy="5006191"/>
+            <a:off x="3057530" y="1439918"/>
+            <a:ext cx="6076941" cy="4855122"/>
           </a:xfrm>
           <a:prstGeom prst="rect">
             <a:avLst/>
@@ -5690,1305 +5690,72 @@
           </a:p>
         </p:txBody>
       </p:sp>
-      <p:graphicFrame>
-        <p:nvGraphicFramePr>
-          <p:cNvPr id="5" name="Table 4">
+      <p:pic>
+        <p:nvPicPr>
+          <p:cNvPr id="4" name="Picture 3">
             <a:extLst>
               <a:ext uri="{FF2B5EF4-FFF2-40B4-BE49-F238E27FC236}">
-                <a16:creationId xmlns:a16="http://schemas.microsoft.com/office/drawing/2014/main" id="{5BD367ED-83F4-5B42-6021-5B6EEE61FFFC}"/>
+                <a16:creationId xmlns:a16="http://schemas.microsoft.com/office/drawing/2014/main" id="{34E4308C-F7B4-D542-28E8-50343F9CC867}"/>
               </a:ext>
             </a:extLst>
           </p:cNvPr>
-          <p:cNvGraphicFramePr>
-            <a:graphicFrameLocks noGrp="1"/>
-          </p:cNvGraphicFramePr>
-          <p:nvPr>
-            <p:extLst>
-              <p:ext uri="{D42A27DB-BD31-4B8C-83A1-F6EECF244321}">
-                <p14:modId xmlns:p14="http://schemas.microsoft.com/office/powerpoint/2010/main" val="281730593"/>
-              </p:ext>
-            </p:extLst>
-          </p:nvPr>
-        </p:nvGraphicFramePr>
-        <p:xfrm>
-          <a:off x="2384713" y="2319190"/>
-          <a:ext cx="6648450" cy="2852015"/>
-        </p:xfrm>
-        <a:graphic>
-          <a:graphicData uri="http://schemas.openxmlformats.org/drawingml/2006/table">
-            <a:tbl>
-              <a:tblPr>
-                <a:tableStyleId>{5C22544A-7EE6-4342-B048-85BDC9FD1C3A}</a:tableStyleId>
-              </a:tblPr>
-              <a:tblGrid>
-                <a:gridCol w="981942">
-                  <a:extLst>
-                    <a:ext uri="{9D8B030D-6E8A-4147-A177-3AD203B41FA5}">
-                      <a16:colId xmlns:a16="http://schemas.microsoft.com/office/drawing/2014/main" val="3608072046"/>
-                    </a:ext>
-                  </a:extLst>
-                </a:gridCol>
-                <a:gridCol w="1416627">
-                  <a:extLst>
-                    <a:ext uri="{9D8B030D-6E8A-4147-A177-3AD203B41FA5}">
-                      <a16:colId xmlns:a16="http://schemas.microsoft.com/office/drawing/2014/main" val="1864319680"/>
-                    </a:ext>
-                  </a:extLst>
-                </a:gridCol>
-                <a:gridCol w="1416627">
-                  <a:extLst>
-                    <a:ext uri="{9D8B030D-6E8A-4147-A177-3AD203B41FA5}">
-                      <a16:colId xmlns:a16="http://schemas.microsoft.com/office/drawing/2014/main" val="576649727"/>
-                    </a:ext>
-                  </a:extLst>
-                </a:gridCol>
-                <a:gridCol w="1416627">
-                  <a:extLst>
-                    <a:ext uri="{9D8B030D-6E8A-4147-A177-3AD203B41FA5}">
-                      <a16:colId xmlns:a16="http://schemas.microsoft.com/office/drawing/2014/main" val="976602449"/>
-                    </a:ext>
-                  </a:extLst>
-                </a:gridCol>
-                <a:gridCol w="1416627">
-                  <a:extLst>
-                    <a:ext uri="{9D8B030D-6E8A-4147-A177-3AD203B41FA5}">
-                      <a16:colId xmlns:a16="http://schemas.microsoft.com/office/drawing/2014/main" val="474740525"/>
-                    </a:ext>
-                  </a:extLst>
-                </a:gridCol>
-              </a:tblGrid>
-              <a:tr h="358885">
-                <a:tc>
-                  <a:txBody>
-                    <a:bodyPr/>
-                    <a:lstStyle/>
-                    <a:p>
-                      <a:pPr algn="l" fontAlgn="b"/>
-                      <a:r>
-                        <a:rPr lang="en-US" sz="1600" u="none" strike="noStrike" dirty="0">
-                          <a:effectLst/>
-                        </a:rPr>
-                        <a:t> </a:t>
-                      </a:r>
-                      <a:endParaRPr lang="en-US" sz="1600" b="0" i="0" u="none" strike="noStrike" dirty="0">
-                        <a:solidFill>
-                          <a:srgbClr val="000000"/>
-                        </a:solidFill>
-                        <a:effectLst/>
-                        <a:latin typeface="Calibri" panose="020F0502020204030204" pitchFamily="34" charset="0"/>
-                      </a:endParaRPr>
-                    </a:p>
-                  </a:txBody>
-                  <a:tcPr marL="9525" marR="9525" marT="9525" marB="0" anchor="b">
-                    <a:solidFill>
-                      <a:schemeClr val="bg1">
-                        <a:lumMod val="65000"/>
-                        <a:lumOff val="35000"/>
-                      </a:schemeClr>
-                    </a:solidFill>
-                  </a:tcPr>
-                </a:tc>
-                <a:tc>
-                  <a:txBody>
-                    <a:bodyPr/>
-                    <a:lstStyle/>
-                    <a:p>
-                      <a:pPr algn="ctr" fontAlgn="b"/>
-                      <a:r>
-                        <a:rPr lang="en-US" sz="1600" u="none" strike="noStrike" dirty="0">
-                          <a:effectLst/>
-                        </a:rPr>
-                        <a:t>Precision</a:t>
-                      </a:r>
-                      <a:endParaRPr lang="en-US" sz="1600" b="0" i="0" u="none" strike="noStrike" dirty="0">
-                        <a:solidFill>
-                          <a:srgbClr val="000000"/>
-                        </a:solidFill>
-                        <a:effectLst/>
-                        <a:latin typeface="Calibri" panose="020F0502020204030204" pitchFamily="34" charset="0"/>
-                      </a:endParaRPr>
-                    </a:p>
-                  </a:txBody>
-                  <a:tcPr marL="9525" marR="9525" marT="9525" marB="0" anchor="b">
-                    <a:solidFill>
-                      <a:schemeClr val="accent6">
-                        <a:lumMod val="40000"/>
-                        <a:lumOff val="60000"/>
-                      </a:schemeClr>
-                    </a:solidFill>
-                  </a:tcPr>
-                </a:tc>
-                <a:tc>
-                  <a:txBody>
-                    <a:bodyPr/>
-                    <a:lstStyle/>
-                    <a:p>
-                      <a:pPr algn="ctr" fontAlgn="b"/>
-                      <a:r>
-                        <a:rPr lang="en-US" sz="1600" u="none" strike="noStrike" dirty="0">
-                          <a:effectLst/>
-                        </a:rPr>
-                        <a:t>Recall</a:t>
-                      </a:r>
-                      <a:endParaRPr lang="en-US" sz="1600" b="0" i="0" u="none" strike="noStrike" dirty="0">
-                        <a:solidFill>
-                          <a:srgbClr val="000000"/>
-                        </a:solidFill>
-                        <a:effectLst/>
-                        <a:latin typeface="Calibri" panose="020F0502020204030204" pitchFamily="34" charset="0"/>
-                      </a:endParaRPr>
-                    </a:p>
-                  </a:txBody>
-                  <a:tcPr marL="9525" marR="9525" marT="9525" marB="0" anchor="b">
-                    <a:solidFill>
-                      <a:schemeClr val="accent6">
-                        <a:lumMod val="40000"/>
-                        <a:lumOff val="60000"/>
-                      </a:schemeClr>
-                    </a:solidFill>
-                  </a:tcPr>
-                </a:tc>
-                <a:tc>
-                  <a:txBody>
-                    <a:bodyPr/>
-                    <a:lstStyle/>
-                    <a:p>
-                      <a:pPr algn="ctr" fontAlgn="b"/>
-                      <a:r>
-                        <a:rPr lang="en-US" sz="1600" u="none" strike="noStrike" dirty="0">
-                          <a:effectLst/>
-                        </a:rPr>
-                        <a:t>F1-Score</a:t>
-                      </a:r>
-                      <a:endParaRPr lang="en-US" sz="1600" b="0" i="0" u="none" strike="noStrike" dirty="0">
-                        <a:solidFill>
-                          <a:srgbClr val="000000"/>
-                        </a:solidFill>
-                        <a:effectLst/>
-                        <a:latin typeface="Calibri" panose="020F0502020204030204" pitchFamily="34" charset="0"/>
-                      </a:endParaRPr>
-                    </a:p>
-                  </a:txBody>
-                  <a:tcPr marL="9525" marR="9525" marT="9525" marB="0" anchor="b">
-                    <a:solidFill>
-                      <a:schemeClr val="accent6">
-                        <a:lumMod val="40000"/>
-                        <a:lumOff val="60000"/>
-                      </a:schemeClr>
-                    </a:solidFill>
-                  </a:tcPr>
-                </a:tc>
-                <a:tc>
-                  <a:txBody>
-                    <a:bodyPr/>
-                    <a:lstStyle/>
-                    <a:p>
-                      <a:pPr algn="ctr" fontAlgn="b"/>
-                      <a:r>
-                        <a:rPr lang="en-US" sz="1600" u="none" strike="noStrike" dirty="0">
-                          <a:effectLst/>
-                        </a:rPr>
-                        <a:t>Support</a:t>
-                      </a:r>
-                      <a:endParaRPr lang="en-US" sz="1600" b="0" i="0" u="none" strike="noStrike" dirty="0">
-                        <a:solidFill>
-                          <a:srgbClr val="000000"/>
-                        </a:solidFill>
-                        <a:effectLst/>
-                        <a:latin typeface="Calibri" panose="020F0502020204030204" pitchFamily="34" charset="0"/>
-                      </a:endParaRPr>
-                    </a:p>
-                  </a:txBody>
-                  <a:tcPr marL="9525" marR="9525" marT="9525" marB="0" anchor="b">
-                    <a:solidFill>
-                      <a:schemeClr val="accent6">
-                        <a:lumMod val="40000"/>
-                        <a:lumOff val="60000"/>
-                      </a:schemeClr>
-                    </a:solidFill>
-                  </a:tcPr>
-                </a:tc>
-                <a:extLst>
-                  <a:ext uri="{0D108BD9-81ED-4DB2-BD59-A6C34878D82A}">
-                    <a16:rowId xmlns:a16="http://schemas.microsoft.com/office/drawing/2014/main" val="1694394648"/>
-                  </a:ext>
-                </a:extLst>
-              </a:tr>
-              <a:tr h="358885">
-                <a:tc>
-                  <a:txBody>
-                    <a:bodyPr/>
-                    <a:lstStyle/>
-                    <a:p>
-                      <a:pPr algn="l" fontAlgn="b"/>
-                      <a:r>
-                        <a:rPr lang="en-US" sz="1600" u="none" strike="noStrike" dirty="0">
-                          <a:solidFill>
-                            <a:schemeClr val="tx2">
-                              <a:lumMod val="75000"/>
-                            </a:schemeClr>
-                          </a:solidFill>
-                          <a:effectLst/>
-                        </a:rPr>
-                        <a:t>              1.0 </a:t>
-                      </a:r>
-                      <a:endParaRPr lang="en-US" sz="1600" b="0" i="0" u="none" strike="noStrike" dirty="0">
-                        <a:solidFill>
-                          <a:schemeClr val="tx2">
-                            <a:lumMod val="75000"/>
-                          </a:schemeClr>
-                        </a:solidFill>
-                        <a:effectLst/>
-                        <a:latin typeface="Calibri" panose="020F0502020204030204" pitchFamily="34" charset="0"/>
-                      </a:endParaRPr>
-                    </a:p>
-                  </a:txBody>
-                  <a:tcPr marL="9525" marR="9525" marT="9525" marB="0" anchor="b"/>
-                </a:tc>
-                <a:tc>
-                  <a:txBody>
-                    <a:bodyPr/>
-                    <a:lstStyle/>
-                    <a:p>
-                      <a:pPr algn="ctr" fontAlgn="b"/>
-                      <a:r>
-                        <a:rPr lang="en-US" sz="1600" u="none" strike="noStrike" dirty="0">
-                          <a:solidFill>
-                            <a:schemeClr val="tx2">
-                              <a:lumMod val="75000"/>
-                            </a:schemeClr>
-                          </a:solidFill>
-                          <a:effectLst/>
-                        </a:rPr>
-                        <a:t>0.18</a:t>
-                      </a:r>
-                      <a:endParaRPr lang="en-US" sz="1600" b="0" i="0" u="none" strike="noStrike" dirty="0">
-                        <a:solidFill>
-                          <a:schemeClr val="tx2">
-                            <a:lumMod val="75000"/>
-                          </a:schemeClr>
-                        </a:solidFill>
-                        <a:effectLst/>
-                        <a:latin typeface="Calibri" panose="020F0502020204030204" pitchFamily="34" charset="0"/>
-                      </a:endParaRPr>
-                    </a:p>
-                  </a:txBody>
-                  <a:tcPr marL="9525" marR="9525" marT="9525" marB="0" anchor="b"/>
-                </a:tc>
-                <a:tc>
-                  <a:txBody>
-                    <a:bodyPr/>
-                    <a:lstStyle/>
-                    <a:p>
-                      <a:pPr algn="ctr" fontAlgn="b"/>
-                      <a:r>
-                        <a:rPr lang="en-US" sz="1600" u="none" strike="noStrike" dirty="0">
-                          <a:solidFill>
-                            <a:schemeClr val="tx2">
-                              <a:lumMod val="75000"/>
-                            </a:schemeClr>
-                          </a:solidFill>
-                          <a:effectLst/>
-                        </a:rPr>
-                        <a:t>0.28</a:t>
-                      </a:r>
-                      <a:endParaRPr lang="en-US" sz="1600" b="0" i="0" u="none" strike="noStrike" dirty="0">
-                        <a:solidFill>
-                          <a:schemeClr val="tx2">
-                            <a:lumMod val="75000"/>
-                          </a:schemeClr>
-                        </a:solidFill>
-                        <a:effectLst/>
-                        <a:latin typeface="Calibri" panose="020F0502020204030204" pitchFamily="34" charset="0"/>
-                      </a:endParaRPr>
-                    </a:p>
-                  </a:txBody>
-                  <a:tcPr marL="9525" marR="9525" marT="9525" marB="0" anchor="b"/>
-                </a:tc>
-                <a:tc>
-                  <a:txBody>
-                    <a:bodyPr/>
-                    <a:lstStyle/>
-                    <a:p>
-                      <a:pPr algn="ctr" fontAlgn="b"/>
-                      <a:r>
-                        <a:rPr lang="en-US" sz="1600" u="none" strike="noStrike" dirty="0">
-                          <a:solidFill>
-                            <a:schemeClr val="tx2">
-                              <a:lumMod val="75000"/>
-                            </a:schemeClr>
-                          </a:solidFill>
-                          <a:effectLst/>
-                        </a:rPr>
-                        <a:t>0.22</a:t>
-                      </a:r>
-                      <a:endParaRPr lang="en-US" sz="1600" b="0" i="0" u="none" strike="noStrike" dirty="0">
-                        <a:solidFill>
-                          <a:schemeClr val="tx2">
-                            <a:lumMod val="75000"/>
-                          </a:schemeClr>
-                        </a:solidFill>
-                        <a:effectLst/>
-                        <a:latin typeface="Calibri" panose="020F0502020204030204" pitchFamily="34" charset="0"/>
-                      </a:endParaRPr>
-                    </a:p>
-                  </a:txBody>
-                  <a:tcPr marL="9525" marR="9525" marT="9525" marB="0" anchor="b"/>
-                </a:tc>
-                <a:tc>
-                  <a:txBody>
-                    <a:bodyPr/>
-                    <a:lstStyle/>
-                    <a:p>
-                      <a:pPr algn="ctr" fontAlgn="b"/>
-                      <a:r>
-                        <a:rPr lang="en-US" sz="1600" u="none" strike="noStrike" dirty="0">
-                          <a:solidFill>
-                            <a:schemeClr val="tx2">
-                              <a:lumMod val="75000"/>
-                            </a:schemeClr>
-                          </a:solidFill>
-                          <a:effectLst/>
-                        </a:rPr>
-                        <a:t>58</a:t>
-                      </a:r>
-                      <a:endParaRPr lang="en-US" sz="1600" b="0" i="0" u="none" strike="noStrike" dirty="0">
-                        <a:solidFill>
-                          <a:schemeClr val="tx2">
-                            <a:lumMod val="75000"/>
-                          </a:schemeClr>
-                        </a:solidFill>
-                        <a:effectLst/>
-                        <a:latin typeface="Calibri" panose="020F0502020204030204" pitchFamily="34" charset="0"/>
-                      </a:endParaRPr>
-                    </a:p>
-                  </a:txBody>
-                  <a:tcPr marL="9525" marR="9525" marT="9525" marB="0" anchor="b"/>
-                </a:tc>
-                <a:extLst>
-                  <a:ext uri="{0D108BD9-81ED-4DB2-BD59-A6C34878D82A}">
-                    <a16:rowId xmlns:a16="http://schemas.microsoft.com/office/drawing/2014/main" val="1607044035"/>
-                  </a:ext>
-                </a:extLst>
-              </a:tr>
-              <a:tr h="358885">
-                <a:tc>
-                  <a:txBody>
-                    <a:bodyPr/>
-                    <a:lstStyle/>
-                    <a:p>
-                      <a:pPr algn="l" fontAlgn="b"/>
-                      <a:r>
-                        <a:rPr lang="en-US" sz="1600" u="none" strike="noStrike" dirty="0">
-                          <a:solidFill>
-                            <a:schemeClr val="tx2">
-                              <a:lumMod val="75000"/>
-                            </a:schemeClr>
-                          </a:solidFill>
-                          <a:effectLst/>
-                        </a:rPr>
-                        <a:t>              2.0 </a:t>
-                      </a:r>
-                      <a:endParaRPr lang="en-US" sz="1600" b="0" i="0" u="none" strike="noStrike" dirty="0">
-                        <a:solidFill>
-                          <a:schemeClr val="tx2">
-                            <a:lumMod val="75000"/>
-                          </a:schemeClr>
-                        </a:solidFill>
-                        <a:effectLst/>
-                        <a:latin typeface="Calibri" panose="020F0502020204030204" pitchFamily="34" charset="0"/>
-                      </a:endParaRPr>
-                    </a:p>
-                  </a:txBody>
-                  <a:tcPr marL="9525" marR="9525" marT="9525" marB="0" anchor="b"/>
-                </a:tc>
-                <a:tc>
-                  <a:txBody>
-                    <a:bodyPr/>
-                    <a:lstStyle/>
-                    <a:p>
-                      <a:pPr algn="ctr" fontAlgn="b"/>
-                      <a:r>
-                        <a:rPr lang="en-US" sz="1600" u="none" strike="noStrike" dirty="0">
-                          <a:solidFill>
-                            <a:schemeClr val="tx2">
-                              <a:lumMod val="75000"/>
-                            </a:schemeClr>
-                          </a:solidFill>
-                          <a:effectLst/>
-                        </a:rPr>
-                        <a:t>0.18</a:t>
-                      </a:r>
-                      <a:endParaRPr lang="en-US" sz="1600" b="0" i="0" u="none" strike="noStrike" dirty="0">
-                        <a:solidFill>
-                          <a:schemeClr val="tx2">
-                            <a:lumMod val="75000"/>
-                          </a:schemeClr>
-                        </a:solidFill>
-                        <a:effectLst/>
-                        <a:latin typeface="Calibri" panose="020F0502020204030204" pitchFamily="34" charset="0"/>
-                      </a:endParaRPr>
-                    </a:p>
-                  </a:txBody>
-                  <a:tcPr marL="9525" marR="9525" marT="9525" marB="0" anchor="b"/>
-                </a:tc>
-                <a:tc>
-                  <a:txBody>
-                    <a:bodyPr/>
-                    <a:lstStyle/>
-                    <a:p>
-                      <a:pPr algn="ctr" fontAlgn="b"/>
-                      <a:r>
-                        <a:rPr lang="en-US" sz="1600" u="none" strike="noStrike" dirty="0">
-                          <a:solidFill>
-                            <a:schemeClr val="tx2">
-                              <a:lumMod val="75000"/>
-                            </a:schemeClr>
-                          </a:solidFill>
-                          <a:effectLst/>
-                        </a:rPr>
-                        <a:t>0.17</a:t>
-                      </a:r>
-                      <a:endParaRPr lang="en-US" sz="1600" b="0" i="0" u="none" strike="noStrike" dirty="0">
-                        <a:solidFill>
-                          <a:schemeClr val="tx2">
-                            <a:lumMod val="75000"/>
-                          </a:schemeClr>
-                        </a:solidFill>
-                        <a:effectLst/>
-                        <a:latin typeface="Calibri" panose="020F0502020204030204" pitchFamily="34" charset="0"/>
-                      </a:endParaRPr>
-                    </a:p>
-                  </a:txBody>
-                  <a:tcPr marL="9525" marR="9525" marT="9525" marB="0" anchor="b"/>
-                </a:tc>
-                <a:tc>
-                  <a:txBody>
-                    <a:bodyPr/>
-                    <a:lstStyle/>
-                    <a:p>
-                      <a:pPr algn="ctr" fontAlgn="b"/>
-                      <a:r>
-                        <a:rPr lang="en-US" sz="1600" u="none" strike="noStrike" dirty="0">
-                          <a:solidFill>
-                            <a:schemeClr val="tx2">
-                              <a:lumMod val="75000"/>
-                            </a:schemeClr>
-                          </a:solidFill>
-                          <a:effectLst/>
-                        </a:rPr>
-                        <a:t>0.17</a:t>
-                      </a:r>
-                      <a:endParaRPr lang="en-US" sz="1600" b="0" i="0" u="none" strike="noStrike" dirty="0">
-                        <a:solidFill>
-                          <a:schemeClr val="tx2">
-                            <a:lumMod val="75000"/>
-                          </a:schemeClr>
-                        </a:solidFill>
-                        <a:effectLst/>
-                        <a:latin typeface="Calibri" panose="020F0502020204030204" pitchFamily="34" charset="0"/>
-                      </a:endParaRPr>
-                    </a:p>
-                  </a:txBody>
-                  <a:tcPr marL="9525" marR="9525" marT="9525" marB="0" anchor="b"/>
-                </a:tc>
-                <a:tc>
-                  <a:txBody>
-                    <a:bodyPr/>
-                    <a:lstStyle/>
-                    <a:p>
-                      <a:pPr algn="ctr" fontAlgn="b"/>
-                      <a:r>
-                        <a:rPr lang="en-US" sz="1600" u="none" strike="noStrike" dirty="0">
-                          <a:solidFill>
-                            <a:schemeClr val="tx2">
-                              <a:lumMod val="75000"/>
-                            </a:schemeClr>
-                          </a:solidFill>
-                          <a:effectLst/>
-                        </a:rPr>
-                        <a:t>224</a:t>
-                      </a:r>
-                      <a:endParaRPr lang="en-US" sz="1600" b="0" i="0" u="none" strike="noStrike" dirty="0">
-                        <a:solidFill>
-                          <a:schemeClr val="tx2">
-                            <a:lumMod val="75000"/>
-                          </a:schemeClr>
-                        </a:solidFill>
-                        <a:effectLst/>
-                        <a:latin typeface="Calibri" panose="020F0502020204030204" pitchFamily="34" charset="0"/>
-                      </a:endParaRPr>
-                    </a:p>
-                  </a:txBody>
-                  <a:tcPr marL="9525" marR="9525" marT="9525" marB="0" anchor="b"/>
-                </a:tc>
-                <a:extLst>
-                  <a:ext uri="{0D108BD9-81ED-4DB2-BD59-A6C34878D82A}">
-                    <a16:rowId xmlns:a16="http://schemas.microsoft.com/office/drawing/2014/main" val="2893686202"/>
-                  </a:ext>
-                </a:extLst>
-              </a:tr>
-              <a:tr h="358885">
-                <a:tc>
-                  <a:txBody>
-                    <a:bodyPr/>
-                    <a:lstStyle/>
-                    <a:p>
-                      <a:pPr algn="l" fontAlgn="b"/>
-                      <a:r>
-                        <a:rPr lang="en-US" sz="1600" u="none" strike="noStrike" dirty="0">
-                          <a:solidFill>
-                            <a:schemeClr val="tx2">
-                              <a:lumMod val="75000"/>
-                            </a:schemeClr>
-                          </a:solidFill>
-                          <a:effectLst/>
-                        </a:rPr>
-                        <a:t>              3.0 </a:t>
-                      </a:r>
-                      <a:endParaRPr lang="en-US" sz="1600" b="0" i="0" u="none" strike="noStrike" dirty="0">
-                        <a:solidFill>
-                          <a:schemeClr val="tx2">
-                            <a:lumMod val="75000"/>
-                          </a:schemeClr>
-                        </a:solidFill>
-                        <a:effectLst/>
-                        <a:latin typeface="Calibri" panose="020F0502020204030204" pitchFamily="34" charset="0"/>
-                      </a:endParaRPr>
-                    </a:p>
-                  </a:txBody>
-                  <a:tcPr marL="9525" marR="9525" marT="9525" marB="0" anchor="b"/>
-                </a:tc>
-                <a:tc>
-                  <a:txBody>
-                    <a:bodyPr/>
-                    <a:lstStyle/>
-                    <a:p>
-                      <a:pPr algn="ctr" fontAlgn="b"/>
-                      <a:r>
-                        <a:rPr lang="en-US" sz="1600" u="none" strike="noStrike" dirty="0">
-                          <a:solidFill>
-                            <a:schemeClr val="tx2">
-                              <a:lumMod val="75000"/>
-                            </a:schemeClr>
-                          </a:solidFill>
-                          <a:effectLst/>
-                        </a:rPr>
-                        <a:t>0.46</a:t>
-                      </a:r>
-                      <a:endParaRPr lang="en-US" sz="1600" b="0" i="0" u="none" strike="noStrike" dirty="0">
-                        <a:solidFill>
-                          <a:schemeClr val="tx2">
-                            <a:lumMod val="75000"/>
-                          </a:schemeClr>
-                        </a:solidFill>
-                        <a:effectLst/>
-                        <a:latin typeface="Calibri" panose="020F0502020204030204" pitchFamily="34" charset="0"/>
-                      </a:endParaRPr>
-                    </a:p>
-                  </a:txBody>
-                  <a:tcPr marL="9525" marR="9525" marT="9525" marB="0" anchor="b"/>
-                </a:tc>
-                <a:tc>
-                  <a:txBody>
-                    <a:bodyPr/>
-                    <a:lstStyle/>
-                    <a:p>
-                      <a:pPr algn="ctr" fontAlgn="b"/>
-                      <a:r>
-                        <a:rPr lang="en-US" sz="1600" u="none" strike="noStrike" dirty="0">
-                          <a:solidFill>
-                            <a:schemeClr val="tx2">
-                              <a:lumMod val="75000"/>
-                            </a:schemeClr>
-                          </a:solidFill>
-                          <a:effectLst/>
-                        </a:rPr>
-                        <a:t>0.41</a:t>
-                      </a:r>
-                      <a:endParaRPr lang="en-US" sz="1600" b="0" i="0" u="none" strike="noStrike" dirty="0">
-                        <a:solidFill>
-                          <a:schemeClr val="tx2">
-                            <a:lumMod val="75000"/>
-                          </a:schemeClr>
-                        </a:solidFill>
-                        <a:effectLst/>
-                        <a:latin typeface="Calibri" panose="020F0502020204030204" pitchFamily="34" charset="0"/>
-                      </a:endParaRPr>
-                    </a:p>
-                  </a:txBody>
-                  <a:tcPr marL="9525" marR="9525" marT="9525" marB="0" anchor="b"/>
-                </a:tc>
-                <a:tc>
-                  <a:txBody>
-                    <a:bodyPr/>
-                    <a:lstStyle/>
-                    <a:p>
-                      <a:pPr algn="ctr" fontAlgn="b"/>
-                      <a:r>
-                        <a:rPr lang="en-US" sz="1600" u="none" strike="noStrike" dirty="0">
-                          <a:solidFill>
-                            <a:schemeClr val="tx2">
-                              <a:lumMod val="75000"/>
-                            </a:schemeClr>
-                          </a:solidFill>
-                          <a:effectLst/>
-                        </a:rPr>
-                        <a:t>0.43</a:t>
-                      </a:r>
-                      <a:endParaRPr lang="en-US" sz="1600" b="0" i="0" u="none" strike="noStrike" dirty="0">
-                        <a:solidFill>
-                          <a:schemeClr val="tx2">
-                            <a:lumMod val="75000"/>
-                          </a:schemeClr>
-                        </a:solidFill>
-                        <a:effectLst/>
-                        <a:latin typeface="Calibri" panose="020F0502020204030204" pitchFamily="34" charset="0"/>
-                      </a:endParaRPr>
-                    </a:p>
-                  </a:txBody>
-                  <a:tcPr marL="9525" marR="9525" marT="9525" marB="0" anchor="b"/>
-                </a:tc>
-                <a:tc>
-                  <a:txBody>
-                    <a:bodyPr/>
-                    <a:lstStyle/>
-                    <a:p>
-                      <a:pPr algn="ctr" fontAlgn="b"/>
-                      <a:r>
-                        <a:rPr lang="en-US" sz="1600" u="none" strike="noStrike" dirty="0">
-                          <a:solidFill>
-                            <a:schemeClr val="tx2">
-                              <a:lumMod val="75000"/>
-                            </a:schemeClr>
-                          </a:solidFill>
-                          <a:effectLst/>
-                        </a:rPr>
-                        <a:t>958</a:t>
-                      </a:r>
-                      <a:endParaRPr lang="en-US" sz="1600" b="0" i="0" u="none" strike="noStrike" dirty="0">
-                        <a:solidFill>
-                          <a:schemeClr val="tx2">
-                            <a:lumMod val="75000"/>
-                          </a:schemeClr>
-                        </a:solidFill>
-                        <a:effectLst/>
-                        <a:latin typeface="Calibri" panose="020F0502020204030204" pitchFamily="34" charset="0"/>
-                      </a:endParaRPr>
-                    </a:p>
-                  </a:txBody>
-                  <a:tcPr marL="9525" marR="9525" marT="9525" marB="0" anchor="b"/>
-                </a:tc>
-                <a:extLst>
-                  <a:ext uri="{0D108BD9-81ED-4DB2-BD59-A6C34878D82A}">
-                    <a16:rowId xmlns:a16="http://schemas.microsoft.com/office/drawing/2014/main" val="4126265396"/>
-                  </a:ext>
-                </a:extLst>
-              </a:tr>
-              <a:tr h="358885">
-                <a:tc>
-                  <a:txBody>
-                    <a:bodyPr/>
-                    <a:lstStyle/>
-                    <a:p>
-                      <a:pPr algn="l" fontAlgn="b"/>
-                      <a:r>
-                        <a:rPr lang="en-US" sz="1600" u="none" strike="noStrike" dirty="0">
-                          <a:solidFill>
-                            <a:schemeClr val="tx2">
-                              <a:lumMod val="75000"/>
-                            </a:schemeClr>
-                          </a:solidFill>
-                          <a:effectLst/>
-                        </a:rPr>
-                        <a:t>              4.0 </a:t>
-                      </a:r>
-                      <a:endParaRPr lang="en-US" sz="1600" b="0" i="0" u="none" strike="noStrike" dirty="0">
-                        <a:solidFill>
-                          <a:schemeClr val="tx2">
-                            <a:lumMod val="75000"/>
-                          </a:schemeClr>
-                        </a:solidFill>
-                        <a:effectLst/>
-                        <a:latin typeface="Calibri" panose="020F0502020204030204" pitchFamily="34" charset="0"/>
-                      </a:endParaRPr>
-                    </a:p>
-                  </a:txBody>
-                  <a:tcPr marL="9525" marR="9525" marT="9525" marB="0" anchor="b"/>
-                </a:tc>
-                <a:tc>
-                  <a:txBody>
-                    <a:bodyPr/>
-                    <a:lstStyle/>
-                    <a:p>
-                      <a:pPr algn="ctr" fontAlgn="b"/>
-                      <a:r>
-                        <a:rPr lang="en-US" sz="1600" u="none" strike="noStrike" dirty="0">
-                          <a:solidFill>
-                            <a:schemeClr val="tx2">
-                              <a:lumMod val="75000"/>
-                            </a:schemeClr>
-                          </a:solidFill>
-                          <a:effectLst/>
-                        </a:rPr>
-                        <a:t>0.72</a:t>
-                      </a:r>
-                      <a:endParaRPr lang="en-US" sz="1600" b="0" i="0" u="none" strike="noStrike" dirty="0">
-                        <a:solidFill>
-                          <a:schemeClr val="tx2">
-                            <a:lumMod val="75000"/>
-                          </a:schemeClr>
-                        </a:solidFill>
-                        <a:effectLst/>
-                        <a:latin typeface="Calibri" panose="020F0502020204030204" pitchFamily="34" charset="0"/>
-                      </a:endParaRPr>
-                    </a:p>
-                  </a:txBody>
-                  <a:tcPr marL="9525" marR="9525" marT="9525" marB="0" anchor="b"/>
-                </a:tc>
-                <a:tc>
-                  <a:txBody>
-                    <a:bodyPr/>
-                    <a:lstStyle/>
-                    <a:p>
-                      <a:pPr algn="ctr" fontAlgn="b"/>
-                      <a:r>
-                        <a:rPr lang="en-US" sz="1600" u="none" strike="noStrike" dirty="0">
-                          <a:solidFill>
-                            <a:schemeClr val="tx2">
-                              <a:lumMod val="75000"/>
-                            </a:schemeClr>
-                          </a:solidFill>
-                          <a:effectLst/>
-                        </a:rPr>
-                        <a:t>0.72</a:t>
-                      </a:r>
-                      <a:endParaRPr lang="en-US" sz="1600" b="0" i="0" u="none" strike="noStrike" dirty="0">
-                        <a:solidFill>
-                          <a:schemeClr val="tx2">
-                            <a:lumMod val="75000"/>
-                          </a:schemeClr>
-                        </a:solidFill>
-                        <a:effectLst/>
-                        <a:latin typeface="Calibri" panose="020F0502020204030204" pitchFamily="34" charset="0"/>
-                      </a:endParaRPr>
-                    </a:p>
-                  </a:txBody>
-                  <a:tcPr marL="9525" marR="9525" marT="9525" marB="0" anchor="b"/>
-                </a:tc>
-                <a:tc>
-                  <a:txBody>
-                    <a:bodyPr/>
-                    <a:lstStyle/>
-                    <a:p>
-                      <a:pPr algn="ctr" fontAlgn="b"/>
-                      <a:r>
-                        <a:rPr lang="en-US" sz="1600" u="none" strike="noStrike" dirty="0">
-                          <a:solidFill>
-                            <a:schemeClr val="tx2">
-                              <a:lumMod val="75000"/>
-                            </a:schemeClr>
-                          </a:solidFill>
-                          <a:effectLst/>
-                        </a:rPr>
-                        <a:t>0.72</a:t>
-                      </a:r>
-                      <a:endParaRPr lang="en-US" sz="1600" b="0" i="0" u="none" strike="noStrike" dirty="0">
-                        <a:solidFill>
-                          <a:schemeClr val="tx2">
-                            <a:lumMod val="75000"/>
-                          </a:schemeClr>
-                        </a:solidFill>
-                        <a:effectLst/>
-                        <a:latin typeface="Calibri" panose="020F0502020204030204" pitchFamily="34" charset="0"/>
-                      </a:endParaRPr>
-                    </a:p>
-                  </a:txBody>
-                  <a:tcPr marL="9525" marR="9525" marT="9525" marB="0" anchor="b"/>
-                </a:tc>
-                <a:tc>
-                  <a:txBody>
-                    <a:bodyPr/>
-                    <a:lstStyle/>
-                    <a:p>
-                      <a:pPr algn="ctr" fontAlgn="b"/>
-                      <a:r>
-                        <a:rPr lang="en-US" sz="1600" u="none" strike="noStrike" dirty="0">
-                          <a:solidFill>
-                            <a:schemeClr val="tx2">
-                              <a:lumMod val="75000"/>
-                            </a:schemeClr>
-                          </a:solidFill>
-                          <a:effectLst/>
-                        </a:rPr>
-                        <a:t>2,194</a:t>
-                      </a:r>
-                      <a:endParaRPr lang="en-US" sz="1600" b="0" i="0" u="none" strike="noStrike" dirty="0">
-                        <a:solidFill>
-                          <a:schemeClr val="tx2">
-                            <a:lumMod val="75000"/>
-                          </a:schemeClr>
-                        </a:solidFill>
-                        <a:effectLst/>
-                        <a:latin typeface="Calibri" panose="020F0502020204030204" pitchFamily="34" charset="0"/>
-                      </a:endParaRPr>
-                    </a:p>
-                  </a:txBody>
-                  <a:tcPr marL="9525" marR="9525" marT="9525" marB="0" anchor="b"/>
-                </a:tc>
-                <a:extLst>
-                  <a:ext uri="{0D108BD9-81ED-4DB2-BD59-A6C34878D82A}">
-                    <a16:rowId xmlns:a16="http://schemas.microsoft.com/office/drawing/2014/main" val="2130196192"/>
-                  </a:ext>
-                </a:extLst>
-              </a:tr>
-              <a:tr h="358885">
-                <a:tc>
-                  <a:txBody>
-                    <a:bodyPr/>
-                    <a:lstStyle/>
-                    <a:p>
-                      <a:pPr algn="l" fontAlgn="b"/>
-                      <a:r>
-                        <a:rPr lang="en-US" sz="1600" u="none" strike="noStrike" dirty="0">
-                          <a:solidFill>
-                            <a:schemeClr val="tx2">
-                              <a:lumMod val="75000"/>
-                            </a:schemeClr>
-                          </a:solidFill>
-                          <a:effectLst/>
-                        </a:rPr>
-                        <a:t>              5.0 </a:t>
-                      </a:r>
-                      <a:endParaRPr lang="en-US" sz="1600" b="0" i="0" u="none" strike="noStrike" dirty="0">
-                        <a:solidFill>
-                          <a:schemeClr val="tx2">
-                            <a:lumMod val="75000"/>
-                          </a:schemeClr>
-                        </a:solidFill>
-                        <a:effectLst/>
-                        <a:latin typeface="Calibri" panose="020F0502020204030204" pitchFamily="34" charset="0"/>
-                      </a:endParaRPr>
-                    </a:p>
-                  </a:txBody>
-                  <a:tcPr marL="9525" marR="9525" marT="9525" marB="0" anchor="b"/>
-                </a:tc>
-                <a:tc>
-                  <a:txBody>
-                    <a:bodyPr/>
-                    <a:lstStyle/>
-                    <a:p>
-                      <a:pPr algn="ctr" fontAlgn="b"/>
-                      <a:r>
-                        <a:rPr lang="en-US" sz="1600" u="none" strike="noStrike" dirty="0">
-                          <a:solidFill>
-                            <a:schemeClr val="tx2">
-                              <a:lumMod val="75000"/>
-                            </a:schemeClr>
-                          </a:solidFill>
-                          <a:effectLst/>
-                        </a:rPr>
-                        <a:t>0.55</a:t>
-                      </a:r>
-                      <a:endParaRPr lang="en-US" sz="1600" b="0" i="0" u="none" strike="noStrike" dirty="0">
-                        <a:solidFill>
-                          <a:schemeClr val="tx2">
-                            <a:lumMod val="75000"/>
-                          </a:schemeClr>
-                        </a:solidFill>
-                        <a:effectLst/>
-                        <a:latin typeface="Calibri" panose="020F0502020204030204" pitchFamily="34" charset="0"/>
-                      </a:endParaRPr>
-                    </a:p>
-                  </a:txBody>
-                  <a:tcPr marL="9525" marR="9525" marT="9525" marB="0" anchor="b"/>
-                </a:tc>
-                <a:tc>
-                  <a:txBody>
-                    <a:bodyPr/>
-                    <a:lstStyle/>
-                    <a:p>
-                      <a:pPr algn="ctr" fontAlgn="b"/>
-                      <a:r>
-                        <a:rPr lang="en-US" sz="1600" u="none" strike="noStrike" dirty="0">
-                          <a:solidFill>
-                            <a:schemeClr val="tx2">
-                              <a:lumMod val="75000"/>
-                            </a:schemeClr>
-                          </a:solidFill>
-                          <a:effectLst/>
-                        </a:rPr>
-                        <a:t>0.61</a:t>
-                      </a:r>
-                      <a:endParaRPr lang="en-US" sz="1600" b="0" i="0" u="none" strike="noStrike" dirty="0">
-                        <a:solidFill>
-                          <a:schemeClr val="tx2">
-                            <a:lumMod val="75000"/>
-                          </a:schemeClr>
-                        </a:solidFill>
-                        <a:effectLst/>
-                        <a:latin typeface="Calibri" panose="020F0502020204030204" pitchFamily="34" charset="0"/>
-                      </a:endParaRPr>
-                    </a:p>
-                  </a:txBody>
-                  <a:tcPr marL="9525" marR="9525" marT="9525" marB="0" anchor="b"/>
-                </a:tc>
-                <a:tc>
-                  <a:txBody>
-                    <a:bodyPr/>
-                    <a:lstStyle/>
-                    <a:p>
-                      <a:pPr algn="ctr" fontAlgn="b"/>
-                      <a:r>
-                        <a:rPr lang="en-US" sz="1600" u="none" strike="noStrike" dirty="0">
-                          <a:solidFill>
-                            <a:schemeClr val="tx2">
-                              <a:lumMod val="75000"/>
-                            </a:schemeClr>
-                          </a:solidFill>
-                          <a:effectLst/>
-                        </a:rPr>
-                        <a:t>0.57</a:t>
-                      </a:r>
-                      <a:endParaRPr lang="en-US" sz="1600" b="0" i="0" u="none" strike="noStrike" dirty="0">
-                        <a:solidFill>
-                          <a:schemeClr val="tx2">
-                            <a:lumMod val="75000"/>
-                          </a:schemeClr>
-                        </a:solidFill>
-                        <a:effectLst/>
-                        <a:latin typeface="Calibri" panose="020F0502020204030204" pitchFamily="34" charset="0"/>
-                      </a:endParaRPr>
-                    </a:p>
-                  </a:txBody>
-                  <a:tcPr marL="9525" marR="9525" marT="9525" marB="0" anchor="b"/>
-                </a:tc>
-                <a:tc>
-                  <a:txBody>
-                    <a:bodyPr/>
-                    <a:lstStyle/>
-                    <a:p>
-                      <a:pPr algn="ctr" fontAlgn="b"/>
-                      <a:r>
-                        <a:rPr lang="en-US" sz="1600" u="none" strike="noStrike" dirty="0">
-                          <a:solidFill>
-                            <a:schemeClr val="tx2">
-                              <a:lumMod val="75000"/>
-                            </a:schemeClr>
-                          </a:solidFill>
-                          <a:effectLst/>
-                        </a:rPr>
-                        <a:t>566</a:t>
-                      </a:r>
-                      <a:endParaRPr lang="en-US" sz="1600" b="0" i="0" u="none" strike="noStrike" dirty="0">
-                        <a:solidFill>
-                          <a:schemeClr val="tx2">
-                            <a:lumMod val="75000"/>
-                          </a:schemeClr>
-                        </a:solidFill>
-                        <a:effectLst/>
-                        <a:latin typeface="Calibri" panose="020F0502020204030204" pitchFamily="34" charset="0"/>
-                      </a:endParaRPr>
-                    </a:p>
-                  </a:txBody>
-                  <a:tcPr marL="9525" marR="9525" marT="9525" marB="0" anchor="b"/>
-                </a:tc>
-                <a:extLst>
-                  <a:ext uri="{0D108BD9-81ED-4DB2-BD59-A6C34878D82A}">
-                    <a16:rowId xmlns:a16="http://schemas.microsoft.com/office/drawing/2014/main" val="1315927540"/>
-                  </a:ext>
-                </a:extLst>
-              </a:tr>
-              <a:tr h="339820">
-                <a:tc>
-                  <a:txBody>
-                    <a:bodyPr/>
-                    <a:lstStyle/>
-                    <a:p>
-                      <a:pPr algn="l" fontAlgn="b"/>
-                      <a:r>
-                        <a:rPr lang="en-US" sz="1600" u="none" strike="noStrike" dirty="0">
-                          <a:effectLst/>
-                        </a:rPr>
-                        <a:t> </a:t>
-                      </a:r>
-                      <a:endParaRPr lang="en-US" sz="1600" b="0" i="0" u="none" strike="noStrike" dirty="0">
-                        <a:solidFill>
-                          <a:srgbClr val="000000"/>
-                        </a:solidFill>
-                        <a:effectLst/>
-                        <a:latin typeface="Calibri" panose="020F0502020204030204" pitchFamily="34" charset="0"/>
-                      </a:endParaRPr>
-                    </a:p>
-                  </a:txBody>
-                  <a:tcPr marL="9525" marR="9525" marT="9525" marB="0" anchor="b">
-                    <a:solidFill>
-                      <a:schemeClr val="bg1">
-                        <a:lumMod val="65000"/>
-                        <a:lumOff val="35000"/>
-                      </a:schemeClr>
-                    </a:solidFill>
-                  </a:tcPr>
-                </a:tc>
-                <a:tc>
-                  <a:txBody>
-                    <a:bodyPr/>
-                    <a:lstStyle/>
-                    <a:p>
-                      <a:pPr algn="ctr" fontAlgn="b"/>
-                      <a:r>
-                        <a:rPr lang="en-US" sz="1600" u="none" strike="noStrike" dirty="0">
-                          <a:effectLst/>
-                        </a:rPr>
-                        <a:t> </a:t>
-                      </a:r>
-                      <a:endParaRPr lang="en-US" sz="1600" b="0" i="0" u="none" strike="noStrike" dirty="0">
-                        <a:solidFill>
-                          <a:srgbClr val="000000"/>
-                        </a:solidFill>
-                        <a:effectLst/>
-                        <a:latin typeface="Calibri" panose="020F0502020204030204" pitchFamily="34" charset="0"/>
-                      </a:endParaRPr>
-                    </a:p>
-                  </a:txBody>
-                  <a:tcPr marL="9525" marR="9525" marT="9525" marB="0" anchor="b">
-                    <a:solidFill>
-                      <a:schemeClr val="bg1">
-                        <a:lumMod val="65000"/>
-                        <a:lumOff val="35000"/>
-                      </a:schemeClr>
-                    </a:solidFill>
-                  </a:tcPr>
-                </a:tc>
-                <a:tc>
-                  <a:txBody>
-                    <a:bodyPr/>
-                    <a:lstStyle/>
-                    <a:p>
-                      <a:pPr algn="ctr" fontAlgn="b"/>
-                      <a:r>
-                        <a:rPr lang="en-US" sz="1600" u="none" strike="noStrike" dirty="0">
-                          <a:effectLst/>
-                        </a:rPr>
-                        <a:t> </a:t>
-                      </a:r>
-                      <a:endParaRPr lang="en-US" sz="1600" b="0" i="0" u="none" strike="noStrike" dirty="0">
-                        <a:solidFill>
-                          <a:srgbClr val="000000"/>
-                        </a:solidFill>
-                        <a:effectLst/>
-                        <a:latin typeface="Calibri" panose="020F0502020204030204" pitchFamily="34" charset="0"/>
-                      </a:endParaRPr>
-                    </a:p>
-                  </a:txBody>
-                  <a:tcPr marL="9525" marR="9525" marT="9525" marB="0" anchor="b">
-                    <a:solidFill>
-                      <a:schemeClr val="bg1">
-                        <a:lumMod val="65000"/>
-                        <a:lumOff val="35000"/>
-                      </a:schemeClr>
-                    </a:solidFill>
-                  </a:tcPr>
-                </a:tc>
-                <a:tc>
-                  <a:txBody>
-                    <a:bodyPr/>
-                    <a:lstStyle/>
-                    <a:p>
-                      <a:pPr algn="ctr" fontAlgn="b"/>
-                      <a:r>
-                        <a:rPr lang="en-US" sz="1600" u="none" strike="noStrike" dirty="0">
-                          <a:effectLst/>
-                        </a:rPr>
-                        <a:t> </a:t>
-                      </a:r>
-                      <a:endParaRPr lang="en-US" sz="1600" b="0" i="0" u="none" strike="noStrike" dirty="0">
-                        <a:solidFill>
-                          <a:srgbClr val="000000"/>
-                        </a:solidFill>
-                        <a:effectLst/>
-                        <a:latin typeface="Calibri" panose="020F0502020204030204" pitchFamily="34" charset="0"/>
-                      </a:endParaRPr>
-                    </a:p>
-                  </a:txBody>
-                  <a:tcPr marL="9525" marR="9525" marT="9525" marB="0" anchor="b">
-                    <a:solidFill>
-                      <a:schemeClr val="bg1">
-                        <a:lumMod val="65000"/>
-                        <a:lumOff val="35000"/>
-                      </a:schemeClr>
-                    </a:solidFill>
-                  </a:tcPr>
-                </a:tc>
-                <a:tc>
-                  <a:txBody>
-                    <a:bodyPr/>
-                    <a:lstStyle/>
-                    <a:p>
-                      <a:pPr algn="ctr" fontAlgn="b"/>
-                      <a:r>
-                        <a:rPr lang="en-US" sz="1600" u="none" strike="noStrike" dirty="0">
-                          <a:effectLst/>
-                        </a:rPr>
-                        <a:t> </a:t>
-                      </a:r>
-                      <a:endParaRPr lang="en-US" sz="1600" b="0" i="0" u="none" strike="noStrike" dirty="0">
-                        <a:solidFill>
-                          <a:srgbClr val="000000"/>
-                        </a:solidFill>
-                        <a:effectLst/>
-                        <a:latin typeface="Calibri" panose="020F0502020204030204" pitchFamily="34" charset="0"/>
-                      </a:endParaRPr>
-                    </a:p>
-                  </a:txBody>
-                  <a:tcPr marL="9525" marR="9525" marT="9525" marB="0" anchor="b">
-                    <a:solidFill>
-                      <a:schemeClr val="bg1">
-                        <a:lumMod val="65000"/>
-                        <a:lumOff val="35000"/>
-                      </a:schemeClr>
-                    </a:solidFill>
-                  </a:tcPr>
-                </a:tc>
-                <a:extLst>
-                  <a:ext uri="{0D108BD9-81ED-4DB2-BD59-A6C34878D82A}">
-                    <a16:rowId xmlns:a16="http://schemas.microsoft.com/office/drawing/2014/main" val="1324132403"/>
-                  </a:ext>
-                </a:extLst>
-              </a:tr>
-              <a:tr h="358885">
-                <a:tc>
-                  <a:txBody>
-                    <a:bodyPr/>
-                    <a:lstStyle/>
-                    <a:p>
-                      <a:pPr algn="r" fontAlgn="b"/>
-                      <a:r>
-                        <a:rPr lang="en-US" sz="1600" u="none" strike="noStrike" dirty="0">
-                          <a:effectLst/>
-                        </a:rPr>
-                        <a:t>Accuracy</a:t>
-                      </a:r>
-                      <a:endParaRPr lang="en-US" sz="1600" b="0" i="0" u="none" strike="noStrike" dirty="0">
-                        <a:solidFill>
-                          <a:srgbClr val="000000"/>
-                        </a:solidFill>
-                        <a:effectLst/>
-                        <a:latin typeface="Calibri" panose="020F0502020204030204" pitchFamily="34" charset="0"/>
-                      </a:endParaRPr>
-                    </a:p>
-                  </a:txBody>
-                  <a:tcPr marL="9525" marR="9525" marT="9525" marB="0" anchor="b"/>
-                </a:tc>
-                <a:tc>
-                  <a:txBody>
-                    <a:bodyPr/>
-                    <a:lstStyle/>
-                    <a:p>
-                      <a:pPr algn="ctr" fontAlgn="b"/>
-                      <a:r>
-                        <a:rPr lang="en-US" sz="1600" u="none" strike="noStrike" dirty="0">
-                          <a:effectLst/>
-                        </a:rPr>
-                        <a:t> </a:t>
-                      </a:r>
-                      <a:endParaRPr lang="en-US" sz="1600" b="0" i="0" u="none" strike="noStrike" dirty="0">
-                        <a:solidFill>
-                          <a:srgbClr val="000000"/>
-                        </a:solidFill>
-                        <a:effectLst/>
-                        <a:latin typeface="Calibri" panose="020F0502020204030204" pitchFamily="34" charset="0"/>
-                      </a:endParaRPr>
-                    </a:p>
-                  </a:txBody>
-                  <a:tcPr marL="9525" marR="9525" marT="9525" marB="0" anchor="b"/>
-                </a:tc>
-                <a:tc>
-                  <a:txBody>
-                    <a:bodyPr/>
-                    <a:lstStyle/>
-                    <a:p>
-                      <a:pPr algn="ctr" fontAlgn="b"/>
-                      <a:r>
-                        <a:rPr lang="en-US" sz="1600" u="none" strike="noStrike" dirty="0">
-                          <a:effectLst/>
-                        </a:rPr>
-                        <a:t> </a:t>
-                      </a:r>
-                      <a:endParaRPr lang="en-US" sz="1600" b="0" i="0" u="none" strike="noStrike" dirty="0">
-                        <a:solidFill>
-                          <a:srgbClr val="000000"/>
-                        </a:solidFill>
-                        <a:effectLst/>
-                        <a:latin typeface="Calibri" panose="020F0502020204030204" pitchFamily="34" charset="0"/>
-                      </a:endParaRPr>
-                    </a:p>
-                  </a:txBody>
-                  <a:tcPr marL="9525" marR="9525" marT="9525" marB="0" anchor="b"/>
-                </a:tc>
-                <a:tc>
-                  <a:txBody>
-                    <a:bodyPr/>
-                    <a:lstStyle/>
-                    <a:p>
-                      <a:pPr algn="ctr" fontAlgn="b"/>
-                      <a:r>
-                        <a:rPr lang="en-US" sz="1600" b="1" u="none" strike="noStrike" dirty="0">
-                          <a:effectLst/>
-                        </a:rPr>
-                        <a:t>0.59</a:t>
-                      </a:r>
-                      <a:endParaRPr lang="en-US" sz="1600" b="1" i="0" u="none" strike="noStrike" dirty="0">
-                        <a:solidFill>
-                          <a:srgbClr val="000000"/>
-                        </a:solidFill>
-                        <a:effectLst/>
-                        <a:latin typeface="Calibri" panose="020F0502020204030204" pitchFamily="34" charset="0"/>
-                      </a:endParaRPr>
-                    </a:p>
-                  </a:txBody>
-                  <a:tcPr marL="9525" marR="9525" marT="9525" marB="0" anchor="b"/>
-                </a:tc>
-                <a:tc>
-                  <a:txBody>
-                    <a:bodyPr/>
-                    <a:lstStyle/>
-                    <a:p>
-                      <a:pPr algn="ctr" fontAlgn="b"/>
-                      <a:r>
-                        <a:rPr lang="en-US" sz="1600" u="none" strike="noStrike" dirty="0">
-                          <a:solidFill>
-                            <a:schemeClr val="tx2">
-                              <a:lumMod val="75000"/>
-                            </a:schemeClr>
-                          </a:solidFill>
-                          <a:effectLst/>
-                        </a:rPr>
-                        <a:t>4,000</a:t>
-                      </a:r>
-                      <a:endParaRPr lang="en-US" sz="1600" b="0" i="0" u="none" strike="noStrike" dirty="0">
-                        <a:solidFill>
-                          <a:schemeClr val="tx2">
-                            <a:lumMod val="75000"/>
-                          </a:schemeClr>
-                        </a:solidFill>
-                        <a:effectLst/>
-                        <a:latin typeface="Calibri" panose="020F0502020204030204" pitchFamily="34" charset="0"/>
-                      </a:endParaRPr>
-                    </a:p>
-                  </a:txBody>
-                  <a:tcPr marL="9525" marR="9525" marT="9525" marB="0" anchor="b"/>
-                </a:tc>
-                <a:extLst>
-                  <a:ext uri="{0D108BD9-81ED-4DB2-BD59-A6C34878D82A}">
-                    <a16:rowId xmlns:a16="http://schemas.microsoft.com/office/drawing/2014/main" val="265544737"/>
-                  </a:ext>
-                </a:extLst>
-              </a:tr>
-            </a:tbl>
-          </a:graphicData>
-        </a:graphic>
-      </p:graphicFrame>
+          <p:cNvPicPr>
+            <a:picLocks noChangeAspect="1"/>
+          </p:cNvPicPr>
+          <p:nvPr/>
+        </p:nvPicPr>
+        <p:blipFill>
+          <a:blip r:embed="rId3"/>
+          <a:stretch>
+            <a:fillRect/>
+          </a:stretch>
+        </p:blipFill>
+        <p:spPr>
+          <a:xfrm>
+            <a:off x="3478137" y="2299192"/>
+            <a:ext cx="5235727" cy="1915510"/>
+          </a:xfrm>
+          <a:prstGeom prst="rect">
+            <a:avLst/>
+          </a:prstGeom>
+        </p:spPr>
+      </p:pic>
+      <p:sp>
+        <p:nvSpPr>
+          <p:cNvPr id="6" name="TextBox 5">
+            <a:extLst>
+              <a:ext uri="{FF2B5EF4-FFF2-40B4-BE49-F238E27FC236}">
+                <a16:creationId xmlns:a16="http://schemas.microsoft.com/office/drawing/2014/main" id="{E98E0791-7B76-9D2F-013D-5C09DF4220E5}"/>
+              </a:ext>
+            </a:extLst>
+          </p:cNvPr>
+          <p:cNvSpPr txBox="1"/>
+          <p:nvPr/>
+        </p:nvSpPr>
+        <p:spPr>
+          <a:xfrm>
+            <a:off x="4506287" y="4597167"/>
+            <a:ext cx="3179427" cy="369332"/>
+          </a:xfrm>
+          <a:prstGeom prst="rect">
+            <a:avLst/>
+          </a:prstGeom>
+          <a:noFill/>
+        </p:spPr>
+        <p:txBody>
+          <a:bodyPr wrap="square" rtlCol="0">
+            <a:spAutoFit/>
+          </a:bodyPr>
+          <a:lstStyle/>
+          <a:p>
+            <a:pPr algn="ctr"/>
+            <a:r>
+              <a:rPr lang="en-US" dirty="0"/>
+              <a:t>Accuracy: 62%</a:t>
+            </a:r>
+          </a:p>
+        </p:txBody>
+      </p:sp>
     </p:spTree>
     <p:extLst>
       <p:ext uri="{BB962C8B-B14F-4D97-AF65-F5344CB8AC3E}">

</xml_diff>